<commit_message>
Update build instructions in slides
</commit_message>
<xml_diff>
--- a/slides/profiling_with_itac.pptx
+++ b/slides/profiling_with_itac.pptx
@@ -8908,7 +8908,7 @@
             </a:r>
             <a:r>
               <a:rPr lang="en-US" dirty="0"/>
-              <a:t>. It is worth Asking SLURM for more temporary disk space on your nodes:</a:t>
+              <a:t>. It is worth Asking SLURM for more temporary disk space on your nodes when doing big runs:</a:t>
             </a:r>
           </a:p>
           <a:p>
@@ -12384,22 +12384,13 @@
               <a:rPr lang="en-GB" sz="1400" dirty="0">
                 <a:latin typeface="Andale Mono" panose="020B0509000000000004" pitchFamily="49" charset="0"/>
               </a:rPr>
-              <a:t>export FLAVOUR_NOCONFLICT=1</a:t>
-            </a:r>
-          </a:p>
-          <a:p>
-            <a:pPr lvl="2"/>
-            <a:r>
-              <a:rPr lang="en-GB" sz="1400" dirty="0">
-                <a:latin typeface="Andale Mono" panose="020B0509000000000004" pitchFamily="49" charset="0"/>
-              </a:rPr>
               <a:t>module load </a:t>
             </a:r>
             <a:r>
               <a:rPr lang="en-GB" sz="1400" dirty="0" err="1">
                 <a:latin typeface="Andale Mono" panose="020B0509000000000004" pitchFamily="49" charset="0"/>
               </a:rPr>
-              <a:t>gcc</a:t>
+              <a:t>oneapi</a:t>
             </a:r>
             <a:r>
               <a:rPr lang="en-GB" sz="1400" dirty="0">
@@ -12411,7 +12402,7 @@
               <a:rPr lang="en-GB" sz="1400" dirty="0" err="1">
                 <a:latin typeface="Andale Mono" panose="020B0509000000000004" pitchFamily="49" charset="0"/>
               </a:rPr>
-              <a:t>oneapi</a:t>
+              <a:t>intelmpi</a:t>
             </a:r>
             <a:r>
               <a:rPr lang="en-GB" sz="1400" dirty="0">
@@ -12423,18 +12414,6 @@
               <a:rPr lang="en-GB" sz="1400" dirty="0" err="1">
                 <a:latin typeface="Andale Mono" panose="020B0509000000000004" pitchFamily="49" charset="0"/>
               </a:rPr>
-              <a:t>intelmpi</a:t>
-            </a:r>
-            <a:r>
-              <a:rPr lang="en-GB" sz="1400" dirty="0">
-                <a:latin typeface="Andale Mono" panose="020B0509000000000004" pitchFamily="49" charset="0"/>
-              </a:rPr>
-              <a:t> </a:t>
-            </a:r>
-            <a:r>
-              <a:rPr lang="en-GB" sz="1400" dirty="0" err="1">
-                <a:latin typeface="Andale Mono" panose="020B0509000000000004" pitchFamily="49" charset="0"/>
-              </a:rPr>
               <a:t>itac</a:t>
             </a:r>
             <a:endParaRPr lang="en-GB" sz="1400" dirty="0">
@@ -12442,7 +12421,10 @@
             </a:endParaRPr>
           </a:p>
           <a:p>
-            <a:pPr lvl="1"/>
+            <a:pPr marL="342900" lvl="1" indent="-342900">
+              <a:buFont typeface="+mj-lt"/>
+              <a:buAutoNum type="arabicPeriod"/>
+            </a:pPr>
             <a:r>
               <a:rPr lang="en-GB" sz="1600" dirty="0">
                 <a:latin typeface="Arial" panose="020B0604020202020204" pitchFamily="34" charset="0"/>
@@ -12560,7 +12542,10 @@
             </a:endParaRPr>
           </a:p>
           <a:p>
-            <a:pPr lvl="1"/>
+            <a:pPr marL="342900" lvl="1" indent="-342900">
+              <a:buFont typeface="+mj-lt"/>
+              <a:buAutoNum type="arabicPeriod"/>
+            </a:pPr>
             <a:r>
               <a:rPr lang="en-GB" sz="1600" dirty="0">
                 <a:latin typeface="Arial" panose="020B0604020202020204" pitchFamily="34" charset="0"/>
@@ -13722,39 +13707,22 @@
               <a:t>Feedback would really be appreciated: </a:t>
             </a:r>
             <a:r>
-              <a:rPr lang="en-GB" b="1" dirty="0">
+              <a:rPr lang="en-GB" b="1" u="sng" dirty="0">
                 <a:solidFill>
                   <a:srgbClr val="FFFF00"/>
                 </a:solidFill>
+                <a:hlinkClick r:id="rId3" tooltip="https://forms.office.com/r/YeFwCZ2kQi">
+                  <a:extLst>
+                    <a:ext uri="{A12FA001-AC4F-418D-AE19-62706E023703}">
+                      <ahyp:hlinkClr xmlns:ahyp="http://schemas.microsoft.com/office/drawing/2018/hyperlinkcolor" val="tx"/>
+                    </a:ext>
+                  </a:extLst>
+                </a:hlinkClick>
               </a:rPr>
-              <a:t>https://</a:t>
-            </a:r>
-            <a:r>
-              <a:rPr lang="en-GB" b="1" dirty="0" err="1">
-                <a:solidFill>
-                  <a:srgbClr val="FFFF00"/>
-                </a:solidFill>
-              </a:rPr>
-              <a:t>bit.ly</a:t>
-            </a:r>
-            <a:r>
-              <a:rPr lang="en-GB" b="1" dirty="0">
-                <a:solidFill>
-                  <a:srgbClr val="FFFF00"/>
-                </a:solidFill>
-              </a:rPr>
-              <a:t>/</a:t>
-            </a:r>
-            <a:r>
-              <a:rPr lang="en-GB" b="1" dirty="0" err="1">
-                <a:solidFill>
-                  <a:srgbClr val="FFFF00"/>
-                </a:solidFill>
-              </a:rPr>
-              <a:t>arc_trainingfeedback</a:t>
-            </a:r>
-            <a:r>
-              <a:rPr lang="en-GB" b="1" dirty="0">
+              <a:t>https://forms.office.com/r/YeFwCZ2kQi</a:t>
+            </a:r>
+            <a:r>
+              <a:rPr lang="en-US" b="1" dirty="0">
                 <a:solidFill>
                   <a:srgbClr val="FFFF00"/>
                 </a:solidFill>

</xml_diff>